<commit_message>
Fixing presentation for Mar. 28
</commit_message>
<xml_diff>
--- a/documentation/slides/PresentationMar28.pptx
+++ b/documentation/slides/PresentationMar28.pptx
@@ -784,7 +784,7 @@
   <p:cSld>
     <p:spTree>
       <p:nvGrpSpPr>
-        <p:cNvPr id="195" name="Shape 195"/>
+        <p:cNvPr id="197" name="Shape 197"/>
         <p:cNvGrpSpPr/>
         <p:nvPr/>
       </p:nvGrpSpPr>
@@ -798,7 +798,7 @@
       </p:grpSpPr>
       <p:sp>
         <p:nvSpPr>
-          <p:cNvPr id="196" name="Google Shape;196;g546129fa56_1_10:notes"/>
+          <p:cNvPr id="198" name="Google Shape;198;g546129fa56_1_10:notes"/>
           <p:cNvSpPr/>
           <p:nvPr>
             <p:ph idx="2" type="sldImg"/>
@@ -833,7 +833,7 @@
       </p:sp>
       <p:sp>
         <p:nvSpPr>
-          <p:cNvPr id="197" name="Google Shape;197;g546129fa56_1_10:notes"/>
+          <p:cNvPr id="199" name="Google Shape;199;g546129fa56_1_10:notes"/>
           <p:cNvSpPr txBox="1"/>
           <p:nvPr>
             <p:ph idx="1" type="body"/>
@@ -883,7 +883,7 @@
   <p:cSld>
     <p:spTree>
       <p:nvGrpSpPr>
-        <p:cNvPr id="202" name="Shape 202"/>
+        <p:cNvPr id="204" name="Shape 204"/>
         <p:cNvGrpSpPr/>
         <p:nvPr/>
       </p:nvGrpSpPr>
@@ -897,7 +897,7 @@
       </p:grpSpPr>
       <p:sp>
         <p:nvSpPr>
-          <p:cNvPr id="203" name="Google Shape;203;g4e9aba5072_0_5:notes"/>
+          <p:cNvPr id="205" name="Google Shape;205;g4e9aba5072_0_5:notes"/>
           <p:cNvSpPr/>
           <p:nvPr>
             <p:ph idx="2" type="sldImg"/>
@@ -932,7 +932,7 @@
       </p:sp>
       <p:sp>
         <p:nvSpPr>
-          <p:cNvPr id="204" name="Google Shape;204;g4e9aba5072_0_5:notes"/>
+          <p:cNvPr id="206" name="Google Shape;206;g4e9aba5072_0_5:notes"/>
           <p:cNvSpPr txBox="1"/>
           <p:nvPr>
             <p:ph idx="1" type="body"/>
@@ -983,7 +983,7 @@
   <p:cSld>
     <p:spTree>
       <p:nvGrpSpPr>
-        <p:cNvPr id="211" name="Shape 211"/>
+        <p:cNvPr id="213" name="Shape 213"/>
         <p:cNvGrpSpPr/>
         <p:nvPr/>
       </p:nvGrpSpPr>
@@ -997,7 +997,7 @@
       </p:grpSpPr>
       <p:sp>
         <p:nvSpPr>
-          <p:cNvPr id="212" name="Google Shape;212;g54927e6baa_0_0:notes"/>
+          <p:cNvPr id="214" name="Google Shape;214;g54927e6baa_0_0:notes"/>
           <p:cNvSpPr/>
           <p:nvPr>
             <p:ph idx="2" type="sldImg"/>
@@ -1032,7 +1032,7 @@
       </p:sp>
       <p:sp>
         <p:nvSpPr>
-          <p:cNvPr id="213" name="Google Shape;213;g54927e6baa_0_0:notes"/>
+          <p:cNvPr id="215" name="Google Shape;215;g54927e6baa_0_0:notes"/>
           <p:cNvSpPr txBox="1"/>
           <p:nvPr>
             <p:ph idx="1" type="body"/>
@@ -1082,7 +1082,7 @@
   <p:cSld>
     <p:spTree>
       <p:nvGrpSpPr>
-        <p:cNvPr id="220" name="Shape 220"/>
+        <p:cNvPr id="222" name="Shape 222"/>
         <p:cNvGrpSpPr/>
         <p:nvPr/>
       </p:nvGrpSpPr>
@@ -1096,7 +1096,7 @@
       </p:grpSpPr>
       <p:sp>
         <p:nvSpPr>
-          <p:cNvPr id="221" name="Google Shape;221;g5218d689bc_3_4:notes"/>
+          <p:cNvPr id="223" name="Google Shape;223;g5218d689bc_3_4:notes"/>
           <p:cNvSpPr/>
           <p:nvPr>
             <p:ph idx="2" type="sldImg"/>
@@ -1131,7 +1131,7 @@
       </p:sp>
       <p:sp>
         <p:nvSpPr>
-          <p:cNvPr id="222" name="Google Shape;222;g5218d689bc_3_4:notes"/>
+          <p:cNvPr id="224" name="Google Shape;224;g5218d689bc_3_4:notes"/>
           <p:cNvSpPr txBox="1"/>
           <p:nvPr>
             <p:ph idx="1" type="body"/>
@@ -1954,7 +1954,8 @@
               <a:buNone/>
             </a:pPr>
             <a:r>
-              <a:t/>
+              <a:rPr lang="en"/>
+              <a:t>Logan</a:t>
             </a:r>
             <a:endParaRPr/>
           </a:p>
@@ -10234,7 +10235,7 @@
   <p:cSld>
     <p:spTree>
       <p:nvGrpSpPr>
-        <p:cNvPr id="198" name="Shape 198"/>
+        <p:cNvPr id="200" name="Shape 200"/>
         <p:cNvGrpSpPr/>
         <p:nvPr/>
       </p:nvGrpSpPr>
@@ -10248,7 +10249,7 @@
       </p:grpSpPr>
       <p:sp>
         <p:nvSpPr>
-          <p:cNvPr id="199" name="Google Shape;199;p22"/>
+          <p:cNvPr id="201" name="Google Shape;201;p22"/>
           <p:cNvSpPr txBox="1"/>
           <p:nvPr>
             <p:ph type="title"/>
@@ -10288,7 +10289,7 @@
       </p:sp>
       <p:sp>
         <p:nvSpPr>
-          <p:cNvPr id="200" name="Google Shape;200;p22"/>
+          <p:cNvPr id="202" name="Google Shape;202;p22"/>
           <p:cNvSpPr txBox="1"/>
           <p:nvPr>
             <p:ph idx="1" type="body"/>
@@ -10390,7 +10391,7 @@
       </p:sp>
       <p:pic>
         <p:nvPicPr>
-          <p:cNvPr id="201" name="Google Shape;201;p22"/>
+          <p:cNvPr id="203" name="Google Shape;203;p22"/>
           <p:cNvPicPr preferRelativeResize="0"/>
           <p:nvPr/>
         </p:nvPicPr>
@@ -10429,7 +10430,7 @@
   <p:cSld>
     <p:spTree>
       <p:nvGrpSpPr>
-        <p:cNvPr id="205" name="Shape 205"/>
+        <p:cNvPr id="207" name="Shape 207"/>
         <p:cNvGrpSpPr/>
         <p:nvPr/>
       </p:nvGrpSpPr>
@@ -10443,7 +10444,7 @@
       </p:grpSpPr>
       <p:sp>
         <p:nvSpPr>
-          <p:cNvPr id="206" name="Google Shape;206;p23"/>
+          <p:cNvPr id="208" name="Google Shape;208;p23"/>
           <p:cNvSpPr txBox="1"/>
           <p:nvPr>
             <p:ph type="title"/>
@@ -10483,7 +10484,7 @@
       </p:sp>
       <p:sp>
         <p:nvSpPr>
-          <p:cNvPr id="207" name="Google Shape;207;p23"/>
+          <p:cNvPr id="209" name="Google Shape;209;p23"/>
           <p:cNvSpPr txBox="1"/>
           <p:nvPr>
             <p:ph idx="1" type="body"/>
@@ -10523,7 +10524,7 @@
       </p:sp>
       <p:pic>
         <p:nvPicPr>
-          <p:cNvPr id="208" name="Google Shape;208;p23"/>
+          <p:cNvPr id="210" name="Google Shape;210;p23"/>
           <p:cNvPicPr preferRelativeResize="0"/>
           <p:nvPr/>
         </p:nvPicPr>
@@ -10551,7 +10552,7 @@
       </p:pic>
       <p:pic>
         <p:nvPicPr>
-          <p:cNvPr id="209" name="Google Shape;209;p23"/>
+          <p:cNvPr id="211" name="Google Shape;211;p23"/>
           <p:cNvPicPr preferRelativeResize="0"/>
           <p:nvPr/>
         </p:nvPicPr>
@@ -10579,7 +10580,7 @@
       </p:pic>
       <p:pic>
         <p:nvPicPr>
-          <p:cNvPr id="210" name="Google Shape;210;p23"/>
+          <p:cNvPr id="212" name="Google Shape;212;p23"/>
           <p:cNvPicPr preferRelativeResize="0"/>
           <p:nvPr/>
         </p:nvPicPr>
@@ -10618,7 +10619,7 @@
   <p:cSld>
     <p:spTree>
       <p:nvGrpSpPr>
-        <p:cNvPr id="214" name="Shape 214"/>
+        <p:cNvPr id="216" name="Shape 216"/>
         <p:cNvGrpSpPr/>
         <p:nvPr/>
       </p:nvGrpSpPr>
@@ -10632,7 +10633,7 @@
       </p:grpSpPr>
       <p:sp>
         <p:nvSpPr>
-          <p:cNvPr id="215" name="Google Shape;215;p24"/>
+          <p:cNvPr id="217" name="Google Shape;217;p24"/>
           <p:cNvSpPr txBox="1"/>
           <p:nvPr>
             <p:ph type="title"/>
@@ -10687,7 +10688,7 @@
       </p:sp>
       <p:sp>
         <p:nvSpPr>
-          <p:cNvPr id="216" name="Google Shape;216;p24"/>
+          <p:cNvPr id="218" name="Google Shape;218;p24"/>
           <p:cNvSpPr txBox="1"/>
           <p:nvPr>
             <p:ph idx="1" type="body"/>
@@ -10727,7 +10728,7 @@
       </p:sp>
       <p:pic>
         <p:nvPicPr>
-          <p:cNvPr id="217" name="Google Shape;217;p24"/>
+          <p:cNvPr id="219" name="Google Shape;219;p24"/>
           <p:cNvPicPr preferRelativeResize="0"/>
           <p:nvPr/>
         </p:nvPicPr>
@@ -10755,7 +10756,7 @@
       </p:pic>
       <p:pic>
         <p:nvPicPr>
-          <p:cNvPr id="218" name="Google Shape;218;p24"/>
+          <p:cNvPr id="220" name="Google Shape;220;p24"/>
           <p:cNvPicPr preferRelativeResize="0"/>
           <p:nvPr/>
         </p:nvPicPr>
@@ -10783,7 +10784,7 @@
       </p:pic>
       <p:pic>
         <p:nvPicPr>
-          <p:cNvPr id="219" name="Google Shape;219;p24"/>
+          <p:cNvPr id="221" name="Google Shape;221;p24"/>
           <p:cNvPicPr preferRelativeResize="0"/>
           <p:nvPr/>
         </p:nvPicPr>
@@ -10822,7 +10823,7 @@
   <p:cSld>
     <p:spTree>
       <p:nvGrpSpPr>
-        <p:cNvPr id="223" name="Shape 223"/>
+        <p:cNvPr id="225" name="Shape 225"/>
         <p:cNvGrpSpPr/>
         <p:nvPr/>
       </p:nvGrpSpPr>
@@ -10836,7 +10837,7 @@
       </p:grpSpPr>
       <p:sp>
         <p:nvSpPr>
-          <p:cNvPr id="224" name="Google Shape;224;p25"/>
+          <p:cNvPr id="226" name="Google Shape;226;p25"/>
           <p:cNvSpPr txBox="1"/>
           <p:nvPr>
             <p:ph type="title"/>
@@ -10876,7 +10877,7 @@
       </p:sp>
       <p:sp>
         <p:nvSpPr>
-          <p:cNvPr id="225" name="Google Shape;225;p25"/>
+          <p:cNvPr id="227" name="Google Shape;227;p25"/>
           <p:cNvSpPr txBox="1"/>
           <p:nvPr>
             <p:ph idx="1" type="body"/>
@@ -11048,7 +11049,7 @@
       </p:sp>
       <p:sp>
         <p:nvSpPr>
-          <p:cNvPr id="226" name="Google Shape;226;p25"/>
+          <p:cNvPr id="228" name="Google Shape;228;p25"/>
           <p:cNvSpPr txBox="1"/>
           <p:nvPr/>
         </p:nvSpPr>
@@ -12509,7 +12510,7 @@
             </a:pPr>
             <a:r>
               <a:rPr lang="en"/>
-              <a:t>Using Pandas DataFrame</a:t>
+              <a:t>Parsing JSON data from MassMine</a:t>
             </a:r>
             <a:endParaRPr/>
           </a:p>
@@ -12531,8 +12532,8 @@
         </p:blipFill>
         <p:spPr>
           <a:xfrm>
-            <a:off x="1297512" y="963461"/>
-            <a:ext cx="6753423" cy="4051000"/>
+            <a:off x="5071763" y="1028700"/>
+            <a:ext cx="3613075" cy="2200125"/>
           </a:xfrm>
           <a:prstGeom prst="rect">
             <a:avLst/>
@@ -12543,6 +12544,650 @@
           </a:ln>
         </p:spPr>
       </p:pic>
+      <p:sp>
+        <p:nvSpPr>
+          <p:cNvPr id="195" name="Google Shape;195;p21"/>
+          <p:cNvSpPr txBox="1"/>
+          <p:nvPr/>
+        </p:nvSpPr>
+        <p:spPr>
+          <a:xfrm>
+            <a:off x="1028700" y="1028700"/>
+            <a:ext cx="3298800" cy="3819300"/>
+          </a:xfrm>
+          <a:prstGeom prst="rect">
+            <a:avLst/>
+          </a:prstGeom>
+          <a:noFill/>
+          <a:ln>
+            <a:noFill/>
+          </a:ln>
+        </p:spPr>
+        <p:txBody>
+          <a:bodyPr anchorCtr="0" anchor="t" bIns="91425" lIns="91425" spcFirstLastPara="1" rIns="91425" wrap="square" tIns="91425">
+            <a:noAutofit/>
+          </a:bodyPr>
+          <a:lstStyle/>
+          <a:p>
+            <a:pPr indent="0" lvl="0" marL="0" rtl="0" algn="l">
+              <a:spcBef>
+                <a:spcPts val="0"/>
+              </a:spcBef>
+              <a:spcAft>
+                <a:spcPts val="0"/>
+              </a:spcAft>
+              <a:buNone/>
+            </a:pPr>
+            <a:r>
+              <a:t/>
+            </a:r>
+            <a:endParaRPr>
+              <a:solidFill>
+                <a:srgbClr val="FFFFFF"/>
+              </a:solidFill>
+              <a:latin typeface="Lato"/>
+              <a:ea typeface="Lato"/>
+              <a:cs typeface="Lato"/>
+              <a:sym typeface="Lato"/>
+            </a:endParaRPr>
+          </a:p>
+          <a:p>
+            <a:pPr indent="-317500" lvl="0" marL="457200" rtl="0" algn="l">
+              <a:spcBef>
+                <a:spcPts val="0"/>
+              </a:spcBef>
+              <a:spcAft>
+                <a:spcPts val="0"/>
+              </a:spcAft>
+              <a:buClr>
+                <a:srgbClr val="FFFFFF"/>
+              </a:buClr>
+              <a:buSzPts val="1400"/>
+              <a:buFont typeface="Lato"/>
+              <a:buChar char="-"/>
+            </a:pPr>
+            <a:r>
+              <a:rPr b="1" lang="en">
+                <a:solidFill>
+                  <a:srgbClr val="FFFFFF"/>
+                </a:solidFill>
+                <a:latin typeface="Lato"/>
+                <a:ea typeface="Lato"/>
+                <a:cs typeface="Lato"/>
+                <a:sym typeface="Lato"/>
+              </a:rPr>
+              <a:t>Ideal</a:t>
+            </a:r>
+            <a:r>
+              <a:rPr lang="en">
+                <a:solidFill>
+                  <a:srgbClr val="FFFFFF"/>
+                </a:solidFill>
+                <a:latin typeface="Lato"/>
+                <a:ea typeface="Lato"/>
+                <a:cs typeface="Lato"/>
+                <a:sym typeface="Lato"/>
+              </a:rPr>
+              <a:t>: </a:t>
+            </a:r>
+            <a:endParaRPr>
+              <a:solidFill>
+                <a:srgbClr val="FFFFFF"/>
+              </a:solidFill>
+              <a:latin typeface="Lato"/>
+              <a:ea typeface="Lato"/>
+              <a:cs typeface="Lato"/>
+              <a:sym typeface="Lato"/>
+            </a:endParaRPr>
+          </a:p>
+          <a:p>
+            <a:pPr indent="0" lvl="0" marL="0" rtl="0" algn="l">
+              <a:spcBef>
+                <a:spcPts val="0"/>
+              </a:spcBef>
+              <a:spcAft>
+                <a:spcPts val="0"/>
+              </a:spcAft>
+              <a:buNone/>
+            </a:pPr>
+            <a:r>
+              <a:t/>
+            </a:r>
+            <a:endParaRPr>
+              <a:solidFill>
+                <a:srgbClr val="FFFFFF"/>
+              </a:solidFill>
+              <a:latin typeface="Lato"/>
+              <a:ea typeface="Lato"/>
+              <a:cs typeface="Lato"/>
+              <a:sym typeface="Lato"/>
+            </a:endParaRPr>
+          </a:p>
+          <a:p>
+            <a:pPr indent="-317500" lvl="1" marL="914400" rtl="0" algn="l">
+              <a:spcBef>
+                <a:spcPts val="0"/>
+              </a:spcBef>
+              <a:spcAft>
+                <a:spcPts val="0"/>
+              </a:spcAft>
+              <a:buClr>
+                <a:srgbClr val="FFFFFF"/>
+              </a:buClr>
+              <a:buSzPts val="1400"/>
+              <a:buFont typeface="Lato"/>
+              <a:buChar char="-"/>
+            </a:pPr>
+            <a:r>
+              <a:rPr lang="en">
+                <a:solidFill>
+                  <a:srgbClr val="FFFFFF"/>
+                </a:solidFill>
+                <a:latin typeface="Lato"/>
+                <a:ea typeface="Lato"/>
+                <a:cs typeface="Lato"/>
+                <a:sym typeface="Lato"/>
+              </a:rPr>
+              <a:t>convert to string then using json.loads() create JSON format</a:t>
+            </a:r>
+            <a:endParaRPr>
+              <a:solidFill>
+                <a:srgbClr val="FFFFFF"/>
+              </a:solidFill>
+              <a:latin typeface="Lato"/>
+              <a:ea typeface="Lato"/>
+              <a:cs typeface="Lato"/>
+              <a:sym typeface="Lato"/>
+            </a:endParaRPr>
+          </a:p>
+          <a:p>
+            <a:pPr indent="0" lvl="0" marL="0" rtl="0" algn="l">
+              <a:spcBef>
+                <a:spcPts val="0"/>
+              </a:spcBef>
+              <a:spcAft>
+                <a:spcPts val="0"/>
+              </a:spcAft>
+              <a:buNone/>
+            </a:pPr>
+            <a:r>
+              <a:t/>
+            </a:r>
+            <a:endParaRPr>
+              <a:solidFill>
+                <a:srgbClr val="FFFFFF"/>
+              </a:solidFill>
+              <a:latin typeface="Lato"/>
+              <a:ea typeface="Lato"/>
+              <a:cs typeface="Lato"/>
+              <a:sym typeface="Lato"/>
+            </a:endParaRPr>
+          </a:p>
+          <a:p>
+            <a:pPr indent="-317500" lvl="1" marL="914400" rtl="0" algn="l">
+              <a:spcBef>
+                <a:spcPts val="0"/>
+              </a:spcBef>
+              <a:spcAft>
+                <a:spcPts val="0"/>
+              </a:spcAft>
+              <a:buClr>
+                <a:srgbClr val="FFFFFF"/>
+              </a:buClr>
+              <a:buSzPts val="1400"/>
+              <a:buFont typeface="Lato"/>
+              <a:buChar char="-"/>
+            </a:pPr>
+            <a:r>
+              <a:rPr lang="en">
+                <a:solidFill>
+                  <a:srgbClr val="FFFFFF"/>
+                </a:solidFill>
+                <a:latin typeface="Lato"/>
+                <a:ea typeface="Lato"/>
+                <a:cs typeface="Lato"/>
+                <a:sym typeface="Lato"/>
+              </a:rPr>
+              <a:t>Problems with format of terminal output</a:t>
+            </a:r>
+            <a:endParaRPr>
+              <a:solidFill>
+                <a:srgbClr val="FFFFFF"/>
+              </a:solidFill>
+              <a:latin typeface="Lato"/>
+              <a:ea typeface="Lato"/>
+              <a:cs typeface="Lato"/>
+              <a:sym typeface="Lato"/>
+            </a:endParaRPr>
+          </a:p>
+          <a:p>
+            <a:pPr indent="0" lvl="0" marL="0" rtl="0" algn="l">
+              <a:spcBef>
+                <a:spcPts val="0"/>
+              </a:spcBef>
+              <a:spcAft>
+                <a:spcPts val="0"/>
+              </a:spcAft>
+              <a:buNone/>
+            </a:pPr>
+            <a:r>
+              <a:t/>
+            </a:r>
+            <a:endParaRPr>
+              <a:solidFill>
+                <a:srgbClr val="FFFFFF"/>
+              </a:solidFill>
+              <a:latin typeface="Lato"/>
+              <a:ea typeface="Lato"/>
+              <a:cs typeface="Lato"/>
+              <a:sym typeface="Lato"/>
+            </a:endParaRPr>
+          </a:p>
+          <a:p>
+            <a:pPr indent="-317500" lvl="0" marL="457200" rtl="0" algn="l">
+              <a:spcBef>
+                <a:spcPts val="0"/>
+              </a:spcBef>
+              <a:spcAft>
+                <a:spcPts val="0"/>
+              </a:spcAft>
+              <a:buClr>
+                <a:srgbClr val="FFFFFF"/>
+              </a:buClr>
+              <a:buSzPts val="1400"/>
+              <a:buFont typeface="Lato"/>
+              <a:buChar char="-"/>
+            </a:pPr>
+            <a:r>
+              <a:rPr b="1" lang="en">
+                <a:solidFill>
+                  <a:srgbClr val="FFFFFF"/>
+                </a:solidFill>
+                <a:latin typeface="Lato"/>
+                <a:ea typeface="Lato"/>
+                <a:cs typeface="Lato"/>
+                <a:sym typeface="Lato"/>
+              </a:rPr>
+              <a:t>Solution</a:t>
+            </a:r>
+            <a:r>
+              <a:rPr lang="en">
+                <a:solidFill>
+                  <a:srgbClr val="FFFFFF"/>
+                </a:solidFill>
+                <a:latin typeface="Lato"/>
+                <a:ea typeface="Lato"/>
+                <a:cs typeface="Lato"/>
+                <a:sym typeface="Lato"/>
+              </a:rPr>
+              <a:t>:</a:t>
+            </a:r>
+            <a:endParaRPr>
+              <a:solidFill>
+                <a:srgbClr val="FFFFFF"/>
+              </a:solidFill>
+              <a:latin typeface="Lato"/>
+              <a:ea typeface="Lato"/>
+              <a:cs typeface="Lato"/>
+              <a:sym typeface="Lato"/>
+            </a:endParaRPr>
+          </a:p>
+          <a:p>
+            <a:pPr indent="0" lvl="0" marL="0" rtl="0" algn="l">
+              <a:spcBef>
+                <a:spcPts val="0"/>
+              </a:spcBef>
+              <a:spcAft>
+                <a:spcPts val="0"/>
+              </a:spcAft>
+              <a:buNone/>
+            </a:pPr>
+            <a:r>
+              <a:t/>
+            </a:r>
+            <a:endParaRPr>
+              <a:solidFill>
+                <a:srgbClr val="FFFFFF"/>
+              </a:solidFill>
+              <a:latin typeface="Lato"/>
+              <a:ea typeface="Lato"/>
+              <a:cs typeface="Lato"/>
+              <a:sym typeface="Lato"/>
+            </a:endParaRPr>
+          </a:p>
+          <a:p>
+            <a:pPr indent="-317500" lvl="1" marL="914400" rtl="0" algn="l">
+              <a:spcBef>
+                <a:spcPts val="0"/>
+              </a:spcBef>
+              <a:spcAft>
+                <a:spcPts val="0"/>
+              </a:spcAft>
+              <a:buClr>
+                <a:srgbClr val="FFFFFF"/>
+              </a:buClr>
+              <a:buSzPts val="1400"/>
+              <a:buFont typeface="Lato"/>
+              <a:buChar char="-"/>
+            </a:pPr>
+            <a:r>
+              <a:rPr lang="en">
+                <a:solidFill>
+                  <a:srgbClr val="FFFFFF"/>
+                </a:solidFill>
+                <a:latin typeface="Lato"/>
+                <a:ea typeface="Lato"/>
+                <a:cs typeface="Lato"/>
+                <a:sym typeface="Lato"/>
+              </a:rPr>
+              <a:t>Convert Each Tweet to List</a:t>
+            </a:r>
+            <a:endParaRPr>
+              <a:solidFill>
+                <a:srgbClr val="FFFFFF"/>
+              </a:solidFill>
+              <a:latin typeface="Lato"/>
+              <a:ea typeface="Lato"/>
+              <a:cs typeface="Lato"/>
+              <a:sym typeface="Lato"/>
+            </a:endParaRPr>
+          </a:p>
+          <a:p>
+            <a:pPr indent="0" lvl="0" marL="0" rtl="0" algn="l">
+              <a:spcBef>
+                <a:spcPts val="0"/>
+              </a:spcBef>
+              <a:spcAft>
+                <a:spcPts val="0"/>
+              </a:spcAft>
+              <a:buNone/>
+            </a:pPr>
+            <a:r>
+              <a:t/>
+            </a:r>
+            <a:endParaRPr>
+              <a:solidFill>
+                <a:srgbClr val="FFFFFF"/>
+              </a:solidFill>
+              <a:latin typeface="Lato"/>
+              <a:ea typeface="Lato"/>
+              <a:cs typeface="Lato"/>
+              <a:sym typeface="Lato"/>
+            </a:endParaRPr>
+          </a:p>
+          <a:p>
+            <a:pPr indent="-317500" lvl="1" marL="914400" rtl="0" algn="l">
+              <a:spcBef>
+                <a:spcPts val="0"/>
+              </a:spcBef>
+              <a:spcAft>
+                <a:spcPts val="0"/>
+              </a:spcAft>
+              <a:buClr>
+                <a:srgbClr val="FFFFFF"/>
+              </a:buClr>
+              <a:buSzPts val="1400"/>
+              <a:buFont typeface="Lato"/>
+              <a:buChar char="-"/>
+            </a:pPr>
+            <a:r>
+              <a:rPr lang="en">
+                <a:solidFill>
+                  <a:srgbClr val="FFFFFF"/>
+                </a:solidFill>
+                <a:latin typeface="Lato"/>
+                <a:ea typeface="Lato"/>
+                <a:cs typeface="Lato"/>
+                <a:sym typeface="Lato"/>
+              </a:rPr>
+              <a:t>Each List contains Tweet data</a:t>
+            </a:r>
+            <a:endParaRPr>
+              <a:solidFill>
+                <a:srgbClr val="FFFFFF"/>
+              </a:solidFill>
+              <a:latin typeface="Lato"/>
+              <a:ea typeface="Lato"/>
+              <a:cs typeface="Lato"/>
+              <a:sym typeface="Lato"/>
+            </a:endParaRPr>
+          </a:p>
+          <a:p>
+            <a:pPr indent="0" lvl="0" marL="0" rtl="0" algn="l">
+              <a:spcBef>
+                <a:spcPts val="0"/>
+              </a:spcBef>
+              <a:spcAft>
+                <a:spcPts val="0"/>
+              </a:spcAft>
+              <a:buNone/>
+            </a:pPr>
+            <a:r>
+              <a:rPr lang="en">
+                <a:solidFill>
+                  <a:srgbClr val="FFFFFF"/>
+                </a:solidFill>
+                <a:latin typeface="Lato"/>
+                <a:ea typeface="Lato"/>
+                <a:cs typeface="Lato"/>
+                <a:sym typeface="Lato"/>
+              </a:rPr>
+              <a:t>	</a:t>
+            </a:r>
+            <a:endParaRPr>
+              <a:solidFill>
+                <a:srgbClr val="FFFFFF"/>
+              </a:solidFill>
+              <a:latin typeface="Lato"/>
+              <a:ea typeface="Lato"/>
+              <a:cs typeface="Lato"/>
+              <a:sym typeface="Lato"/>
+            </a:endParaRPr>
+          </a:p>
+        </p:txBody>
+      </p:sp>
+      <p:sp>
+        <p:nvSpPr>
+          <p:cNvPr id="196" name="Google Shape;196;p21"/>
+          <p:cNvSpPr txBox="1"/>
+          <p:nvPr/>
+        </p:nvSpPr>
+        <p:spPr>
+          <a:xfrm>
+            <a:off x="5042588" y="3381700"/>
+            <a:ext cx="3671400" cy="1507500"/>
+          </a:xfrm>
+          <a:prstGeom prst="rect">
+            <a:avLst/>
+          </a:prstGeom>
+          <a:noFill/>
+          <a:ln>
+            <a:noFill/>
+          </a:ln>
+        </p:spPr>
+        <p:txBody>
+          <a:bodyPr anchorCtr="0" anchor="t" bIns="91425" lIns="91425" spcFirstLastPara="1" rIns="91425" wrap="square" tIns="91425">
+            <a:noAutofit/>
+          </a:bodyPr>
+          <a:lstStyle/>
+          <a:p>
+            <a:pPr indent="0" lvl="0" marL="0" rtl="0" algn="l">
+              <a:spcBef>
+                <a:spcPts val="0"/>
+              </a:spcBef>
+              <a:spcAft>
+                <a:spcPts val="0"/>
+              </a:spcAft>
+              <a:buNone/>
+            </a:pPr>
+            <a:r>
+              <a:rPr lang="en">
+                <a:solidFill>
+                  <a:srgbClr val="FFFFFF"/>
+                </a:solidFill>
+                <a:latin typeface="Lato"/>
+                <a:ea typeface="Lato"/>
+                <a:cs typeface="Lato"/>
+                <a:sym typeface="Lato"/>
+              </a:rPr>
+              <a:t>TO DO:</a:t>
+            </a:r>
+            <a:endParaRPr>
+              <a:solidFill>
+                <a:srgbClr val="FFFFFF"/>
+              </a:solidFill>
+              <a:latin typeface="Lato"/>
+              <a:ea typeface="Lato"/>
+              <a:cs typeface="Lato"/>
+              <a:sym typeface="Lato"/>
+            </a:endParaRPr>
+          </a:p>
+          <a:p>
+            <a:pPr indent="0" lvl="0" marL="457200" rtl="0" algn="l">
+              <a:spcBef>
+                <a:spcPts val="0"/>
+              </a:spcBef>
+              <a:spcAft>
+                <a:spcPts val="0"/>
+              </a:spcAft>
+              <a:buNone/>
+            </a:pPr>
+            <a:r>
+              <a:t/>
+            </a:r>
+            <a:endParaRPr>
+              <a:solidFill>
+                <a:srgbClr val="FFFFFF"/>
+              </a:solidFill>
+              <a:latin typeface="Lato"/>
+              <a:ea typeface="Lato"/>
+              <a:cs typeface="Lato"/>
+              <a:sym typeface="Lato"/>
+            </a:endParaRPr>
+          </a:p>
+          <a:p>
+            <a:pPr indent="-317500" lvl="0" marL="457200" rtl="0" algn="l">
+              <a:spcBef>
+                <a:spcPts val="0"/>
+              </a:spcBef>
+              <a:spcAft>
+                <a:spcPts val="0"/>
+              </a:spcAft>
+              <a:buClr>
+                <a:srgbClr val="FFFFFF"/>
+              </a:buClr>
+              <a:buSzPts val="1400"/>
+              <a:buFont typeface="Lato"/>
+              <a:buChar char="-"/>
+            </a:pPr>
+            <a:r>
+              <a:rPr lang="en">
+                <a:solidFill>
+                  <a:srgbClr val="FFFFFF"/>
+                </a:solidFill>
+                <a:latin typeface="Lato"/>
+                <a:ea typeface="Lato"/>
+                <a:cs typeface="Lato"/>
+                <a:sym typeface="Lato"/>
+              </a:rPr>
+              <a:t>Implement parsing / storing algorithm as an </a:t>
+            </a:r>
+            <a:r>
+              <a:rPr lang="en">
+                <a:solidFill>
+                  <a:srgbClr val="FFFFFF"/>
+                </a:solidFill>
+                <a:latin typeface="Lato"/>
+                <a:ea typeface="Lato"/>
+                <a:cs typeface="Lato"/>
+                <a:sym typeface="Lato"/>
+              </a:rPr>
+              <a:t>asynchronous</a:t>
+            </a:r>
+            <a:r>
+              <a:rPr lang="en">
+                <a:solidFill>
+                  <a:srgbClr val="FFFFFF"/>
+                </a:solidFill>
+                <a:latin typeface="Lato"/>
+                <a:ea typeface="Lato"/>
+                <a:cs typeface="Lato"/>
+                <a:sym typeface="Lato"/>
+              </a:rPr>
+              <a:t> task</a:t>
+            </a:r>
+            <a:endParaRPr>
+              <a:solidFill>
+                <a:srgbClr val="FFFFFF"/>
+              </a:solidFill>
+              <a:latin typeface="Lato"/>
+              <a:ea typeface="Lato"/>
+              <a:cs typeface="Lato"/>
+              <a:sym typeface="Lato"/>
+            </a:endParaRPr>
+          </a:p>
+          <a:p>
+            <a:pPr indent="0" lvl="0" marL="0" rtl="0" algn="l">
+              <a:spcBef>
+                <a:spcPts val="0"/>
+              </a:spcBef>
+              <a:spcAft>
+                <a:spcPts val="0"/>
+              </a:spcAft>
+              <a:buNone/>
+            </a:pPr>
+            <a:r>
+              <a:t/>
+            </a:r>
+            <a:endParaRPr>
+              <a:solidFill>
+                <a:srgbClr val="FFFFFF"/>
+              </a:solidFill>
+              <a:latin typeface="Lato"/>
+              <a:ea typeface="Lato"/>
+              <a:cs typeface="Lato"/>
+              <a:sym typeface="Lato"/>
+            </a:endParaRPr>
+          </a:p>
+          <a:p>
+            <a:pPr indent="-317500" lvl="0" marL="457200" rtl="0" algn="l">
+              <a:spcBef>
+                <a:spcPts val="0"/>
+              </a:spcBef>
+              <a:spcAft>
+                <a:spcPts val="0"/>
+              </a:spcAft>
+              <a:buClr>
+                <a:srgbClr val="FFFFFF"/>
+              </a:buClr>
+              <a:buSzPts val="1400"/>
+              <a:buFont typeface="Lato"/>
+              <a:buChar char="-"/>
+            </a:pPr>
+            <a:r>
+              <a:rPr lang="en">
+                <a:solidFill>
+                  <a:srgbClr val="FFFFFF"/>
+                </a:solidFill>
+                <a:latin typeface="Lato"/>
+                <a:ea typeface="Lato"/>
+                <a:cs typeface="Lato"/>
+                <a:sym typeface="Lato"/>
+              </a:rPr>
+              <a:t>Connect to Study Model</a:t>
+            </a:r>
+            <a:endParaRPr>
+              <a:solidFill>
+                <a:srgbClr val="FFFFFF"/>
+              </a:solidFill>
+              <a:latin typeface="Lato"/>
+              <a:ea typeface="Lato"/>
+              <a:cs typeface="Lato"/>
+              <a:sym typeface="Lato"/>
+            </a:endParaRPr>
+          </a:p>
+        </p:txBody>
+      </p:sp>
     </p:spTree>
   </p:cSld>
   <p:clrMapOvr>

</xml_diff>